<commit_message>
Update 1. Introduction to Python Programming.pptx
</commit_message>
<xml_diff>
--- a/1. Introduction to Python Programming.pptx
+++ b/1. Introduction to Python Programming.pptx
@@ -133,10 +133,6 @@
 </p:cmAuthorLst>
 </file>
 
-<file path=ppt/revisionInfo.xml><?xml version="1.0" encoding="utf-8"?>
-<p1510:revInfo xmlns:a="http://schemas.openxmlformats.org/drawingml/2006/main" xmlns:r="http://schemas.openxmlformats.org/officeDocument/2006/relationships" xmlns:p1510="http://schemas.microsoft.com/office/powerpoint/2015/10/main"/>
-</file>
-
 <file path=ppt/comments/comment1.xml><?xml version="1.0" encoding="utf-8"?>
 <p:cmLst xmlns:a="http://schemas.openxmlformats.org/drawingml/2006/main" xmlns:r="http://schemas.openxmlformats.org/officeDocument/2006/relationships" xmlns:p="http://schemas.openxmlformats.org/presentationml/2006/main">
   <p:cm authorId="1" dt="2017-12-22T13:50:36.803" idx="1">
@@ -337,7 +333,7 @@
           <a:p>
             <a:fld id="{4AAD347D-5ACD-4C99-B74B-A9C85AD731AF}" type="datetimeFigureOut">
               <a:rPr lang="en-US" dirty="0"/>
-              <a:t>12/22/2017</a:t>
+              <a:t>3/31/2023</a:t>
             </a:fld>
             <a:endParaRPr lang="en-US" dirty="0"/>
           </a:p>
@@ -607,7 +603,7 @@
           <a:p>
             <a:fld id="{4509A250-FF31-4206-8172-F9D3106AACB1}" type="datetimeFigureOut">
               <a:rPr lang="en-US" dirty="0"/>
-              <a:t>12/22/2017</a:t>
+              <a:t>3/31/2023</a:t>
             </a:fld>
             <a:endParaRPr lang="en-US" dirty="0"/>
           </a:p>
@@ -796,7 +792,7 @@
           <a:p>
             <a:fld id="{4509A250-FF31-4206-8172-F9D3106AACB1}" type="datetimeFigureOut">
               <a:rPr lang="en-US" dirty="0"/>
-              <a:t>12/22/2017</a:t>
+              <a:t>3/31/2023</a:t>
             </a:fld>
             <a:endParaRPr lang="en-US" dirty="0"/>
           </a:p>
@@ -1064,7 +1060,7 @@
           <a:p>
             <a:fld id="{4509A250-FF31-4206-8172-F9D3106AACB1}" type="datetimeFigureOut">
               <a:rPr lang="en-US" dirty="0"/>
-              <a:t>12/22/2017</a:t>
+              <a:t>3/31/2023</a:t>
             </a:fld>
             <a:endParaRPr lang="en-US" dirty="0"/>
           </a:p>
@@ -1400,7 +1396,7 @@
           <a:p>
             <a:fld id="{4509A250-FF31-4206-8172-F9D3106AACB1}" type="datetimeFigureOut">
               <a:rPr lang="en-US" dirty="0"/>
-              <a:t>12/22/2017</a:t>
+              <a:t>3/31/2023</a:t>
             </a:fld>
             <a:endParaRPr lang="en-US" dirty="0"/>
           </a:p>
@@ -2018,7 +2014,7 @@
           <a:p>
             <a:fld id="{4509A250-FF31-4206-8172-F9D3106AACB1}" type="datetimeFigureOut">
               <a:rPr lang="en-US" dirty="0"/>
-              <a:t>12/22/2017</a:t>
+              <a:t>3/31/2023</a:t>
             </a:fld>
             <a:endParaRPr lang="en-US" dirty="0"/>
           </a:p>
@@ -2873,7 +2869,7 @@
           <a:p>
             <a:fld id="{4509A250-FF31-4206-8172-F9D3106AACB1}" type="datetimeFigureOut">
               <a:rPr lang="en-US" dirty="0"/>
-              <a:t>12/22/2017</a:t>
+              <a:t>3/31/2023</a:t>
             </a:fld>
             <a:endParaRPr lang="en-US" dirty="0"/>
           </a:p>
@@ -3038,7 +3034,7 @@
           <a:p>
             <a:fld id="{4509A250-FF31-4206-8172-F9D3106AACB1}" type="datetimeFigureOut">
               <a:rPr lang="en-US" dirty="0"/>
-              <a:t>12/22/2017</a:t>
+              <a:t>3/31/2023</a:t>
             </a:fld>
             <a:endParaRPr lang="en-US" dirty="0"/>
           </a:p>
@@ -3213,7 +3209,7 @@
           <a:p>
             <a:fld id="{4509A250-FF31-4206-8172-F9D3106AACB1}" type="datetimeFigureOut">
               <a:rPr lang="en-US" dirty="0"/>
-              <a:t>12/22/2017</a:t>
+              <a:t>3/31/2023</a:t>
             </a:fld>
             <a:endParaRPr lang="en-US" dirty="0"/>
           </a:p>
@@ -3378,7 +3374,7 @@
           <a:p>
             <a:fld id="{4509A250-FF31-4206-8172-F9D3106AACB1}" type="datetimeFigureOut">
               <a:rPr lang="en-US" dirty="0"/>
-              <a:t>12/22/2017</a:t>
+              <a:t>3/31/2023</a:t>
             </a:fld>
             <a:endParaRPr lang="en-US" dirty="0"/>
           </a:p>
@@ -3620,7 +3616,7 @@
           <a:p>
             <a:fld id="{9796027F-7875-4030-9381-8BD8C4F21935}" type="datetimeFigureOut">
               <a:rPr lang="en-US" dirty="0"/>
-              <a:t>12/22/2017</a:t>
+              <a:t>3/31/2023</a:t>
             </a:fld>
             <a:endParaRPr lang="en-US" dirty="0"/>
           </a:p>
@@ -3907,7 +3903,7 @@
           <a:p>
             <a:fld id="{9796027F-7875-4030-9381-8BD8C4F21935}" type="datetimeFigureOut">
               <a:rPr lang="en-US" dirty="0"/>
-              <a:t>12/22/2017</a:t>
+              <a:t>3/31/2023</a:t>
             </a:fld>
             <a:endParaRPr lang="en-US" dirty="0"/>
           </a:p>
@@ -4346,7 +4342,7 @@
           <a:p>
             <a:fld id="{9796027F-7875-4030-9381-8BD8C4F21935}" type="datetimeFigureOut">
               <a:rPr lang="en-US" dirty="0"/>
-              <a:t>12/22/2017</a:t>
+              <a:t>3/31/2023</a:t>
             </a:fld>
             <a:endParaRPr lang="en-US" dirty="0"/>
           </a:p>
@@ -4459,7 +4455,7 @@
           <a:p>
             <a:fld id="{4509A250-FF31-4206-8172-F9D3106AACB1}" type="datetimeFigureOut">
               <a:rPr lang="en-US" dirty="0"/>
-              <a:t>12/22/2017</a:t>
+              <a:t>3/31/2023</a:t>
             </a:fld>
             <a:endParaRPr lang="en-US" dirty="0"/>
           </a:p>
@@ -4549,7 +4545,7 @@
           <a:p>
             <a:fld id="{4509A250-FF31-4206-8172-F9D3106AACB1}" type="datetimeFigureOut">
               <a:rPr lang="en-US" dirty="0"/>
-              <a:t>12/22/2017</a:t>
+              <a:t>3/31/2023</a:t>
             </a:fld>
             <a:endParaRPr lang="en-US" dirty="0"/>
           </a:p>
@@ -4823,7 +4819,7 @@
           <a:p>
             <a:fld id="{4509A250-FF31-4206-8172-F9D3106AACB1}" type="datetimeFigureOut">
               <a:rPr lang="en-US" dirty="0"/>
-              <a:t>12/22/2017</a:t>
+              <a:t>3/31/2023</a:t>
             </a:fld>
             <a:endParaRPr lang="en-US" dirty="0"/>
           </a:p>
@@ -5093,7 +5089,7 @@
           <a:p>
             <a:fld id="{4509A250-FF31-4206-8172-F9D3106AACB1}" type="datetimeFigureOut">
               <a:rPr lang="en-US" dirty="0"/>
-              <a:t>12/22/2017</a:t>
+              <a:t>3/31/2023</a:t>
             </a:fld>
             <a:endParaRPr lang="en-US" dirty="0"/>
           </a:p>
@@ -5517,7 +5513,7 @@
           <a:p>
             <a:fld id="{4AAD347D-5ACD-4C99-B74B-A9C85AD731AF}" type="datetimeFigureOut">
               <a:rPr lang="en-US" dirty="0"/>
-              <a:t>12/22/2017</a:t>
+              <a:t>3/31/2023</a:t>
             </a:fld>
             <a:endParaRPr lang="en-US" dirty="0"/>
           </a:p>
@@ -6064,8 +6060,13 @@
           <a:p>
             <a:r>
               <a:rPr lang="en-IN" dirty="0"/>
-              <a:t>Introduction to Python Programming</a:t>
-            </a:r>
+              <a:t>Introduction to </a:t>
+            </a:r>
+            <a:r>
+              <a:rPr lang="en-IN"/>
+              <a:t>Python Programming </a:t>
+            </a:r>
+            <a:endParaRPr lang="en-IN" dirty="0"/>
           </a:p>
         </p:txBody>
       </p:sp>

</xml_diff>